<commit_message>
Fix presentation ppt slide
</commit_message>
<xml_diff>
--- a/Specification and Modeling/PredragRadak-Presentation.pptx
+++ b/Specification and Modeling/PredragRadak-Presentation.pptx
@@ -258,7 +258,7 @@
           <a:p>
             <a:fld id="{04924C89-683E-40C1-9F2B-BE36D0B7E9E8}" type="datetimeFigureOut">
               <a:rPr lang="en-US" smtClean="0"/>
-              <a:t>30-Aug-23</a:t>
+              <a:t>03-Sep-23</a:t>
             </a:fld>
             <a:endParaRPr lang="en-US"/>
           </a:p>
@@ -418,7 +418,7 @@
           <a:p>
             <a:fld id="{04924C89-683E-40C1-9F2B-BE36D0B7E9E8}" type="datetimeFigureOut">
               <a:rPr lang="en-US" smtClean="0"/>
-              <a:t>30-Aug-23</a:t>
+              <a:t>03-Sep-23</a:t>
             </a:fld>
             <a:endParaRPr lang="en-US"/>
           </a:p>
@@ -663,7 +663,7 @@
           <a:p>
             <a:fld id="{04924C89-683E-40C1-9F2B-BE36D0B7E9E8}" type="datetimeFigureOut">
               <a:rPr lang="en-US" smtClean="0"/>
-              <a:t>30-Aug-23</a:t>
+              <a:t>03-Sep-23</a:t>
             </a:fld>
             <a:endParaRPr lang="en-US"/>
           </a:p>
@@ -2373,13 +2373,13 @@
   <p:clrMapOvr>
     <a:masterClrMapping/>
   </p:clrMapOvr>
-  <mc:AlternateContent xmlns:mc="http://schemas.openxmlformats.org/markup-compatibility/2006">
-    <mc:Choice xmlns:p14="http://schemas.microsoft.com/office/powerpoint/2010/main" Requires="p14">
+  <mc:AlternateContent xmlns:mc="http://schemas.openxmlformats.org/markup-compatibility/2006" xmlns:p14="http://schemas.microsoft.com/office/powerpoint/2010/main">
+    <mc:Choice Requires="p14">
       <p:transition spd="slow" p14:dur="800">
         <p:circle/>
       </p:transition>
     </mc:Choice>
-    <mc:Fallback>
+    <mc:Fallback xmlns="">
       <p:transition spd="slow">
         <p:circle/>
       </p:transition>
@@ -4238,13 +4238,13 @@
   <p:clrMapOvr>
     <a:masterClrMapping/>
   </p:clrMapOvr>
-  <mc:AlternateContent xmlns:mc="http://schemas.openxmlformats.org/markup-compatibility/2006">
-    <mc:Choice xmlns:p14="http://schemas.microsoft.com/office/powerpoint/2010/main" Requires="p14">
+  <mc:AlternateContent xmlns:mc="http://schemas.openxmlformats.org/markup-compatibility/2006" xmlns:p14="http://schemas.microsoft.com/office/powerpoint/2010/main">
+    <mc:Choice Requires="p14">
       <p:transition spd="slow" p14:dur="1600">
         <p14:prism isInverted="1"/>
       </p:transition>
     </mc:Choice>
-    <mc:Fallback>
+    <mc:Fallback xmlns="">
       <p:transition spd="slow">
         <p:fade/>
       </p:transition>
@@ -5789,13 +5789,13 @@
   <p:clrMapOvr>
     <a:masterClrMapping/>
   </p:clrMapOvr>
-  <mc:AlternateContent xmlns:mc="http://schemas.openxmlformats.org/markup-compatibility/2006">
-    <mc:Choice xmlns:p14="http://schemas.microsoft.com/office/powerpoint/2010/main" Requires="p14">
+  <mc:AlternateContent xmlns:mc="http://schemas.openxmlformats.org/markup-compatibility/2006" xmlns:p14="http://schemas.microsoft.com/office/powerpoint/2010/main">
+    <mc:Choice Requires="p14">
       <p:transition spd="slow" p14:dur="3900">
         <p14:glitter pattern="hexagon"/>
       </p:transition>
     </mc:Choice>
-    <mc:Fallback>
+    <mc:Fallback xmlns="">
       <p:transition spd="slow">
         <p:fade/>
       </p:transition>
@@ -6225,13 +6225,13 @@
   <p:clrMapOvr>
     <a:masterClrMapping/>
   </p:clrMapOvr>
-  <mc:AlternateContent xmlns:mc="http://schemas.openxmlformats.org/markup-compatibility/2006">
-    <mc:Choice xmlns:p14="http://schemas.microsoft.com/office/powerpoint/2010/main" Requires="p14">
+  <mc:AlternateContent xmlns:mc="http://schemas.openxmlformats.org/markup-compatibility/2006" xmlns:p14="http://schemas.microsoft.com/office/powerpoint/2010/main">
+    <mc:Choice Requires="p14">
       <p:transition spd="slow" p14:dur="1400">
         <p14:ripple/>
       </p:transition>
     </mc:Choice>
-    <mc:Fallback>
+    <mc:Fallback xmlns="">
       <p:transition spd="slow">
         <p:fade/>
       </p:transition>
@@ -6563,13 +6563,13 @@
   <p:clrMapOvr>
     <a:masterClrMapping/>
   </p:clrMapOvr>
-  <mc:AlternateContent xmlns:mc="http://schemas.openxmlformats.org/markup-compatibility/2006">
-    <mc:Choice xmlns:p14="http://schemas.microsoft.com/office/powerpoint/2010/main" Requires="p14">
+  <mc:AlternateContent xmlns:mc="http://schemas.openxmlformats.org/markup-compatibility/2006" xmlns:p14="http://schemas.microsoft.com/office/powerpoint/2010/main">
+    <mc:Choice Requires="p14">
       <p:transition spd="slow" p14:dur="1200">
         <p14:prism/>
       </p:transition>
     </mc:Choice>
-    <mc:Fallback>
+    <mc:Fallback xmlns="">
       <p:transition spd="slow">
         <p:fade/>
       </p:transition>
@@ -7842,13 +7842,13 @@
   <p:clrMapOvr>
     <a:masterClrMapping/>
   </p:clrMapOvr>
-  <mc:AlternateContent xmlns:mc="http://schemas.openxmlformats.org/markup-compatibility/2006">
-    <mc:Choice xmlns:p14="http://schemas.microsoft.com/office/powerpoint/2010/main" Requires="p14">
+  <mc:AlternateContent xmlns:mc="http://schemas.openxmlformats.org/markup-compatibility/2006" xmlns:p14="http://schemas.microsoft.com/office/powerpoint/2010/main">
+    <mc:Choice Requires="p14">
       <p:transition p14:dur="100">
         <p:cut/>
       </p:transition>
     </mc:Choice>
-    <mc:Fallback>
+    <mc:Fallback xmlns="">
       <p:transition>
         <p:cut/>
       </p:transition>
@@ -9528,13 +9528,13 @@
   <p:clrMapOvr>
     <a:masterClrMapping/>
   </p:clrMapOvr>
-  <mc:AlternateContent xmlns:mc="http://schemas.openxmlformats.org/markup-compatibility/2006">
-    <mc:Choice xmlns:p14="http://schemas.microsoft.com/office/powerpoint/2010/main" Requires="p14">
+  <mc:AlternateContent xmlns:mc="http://schemas.openxmlformats.org/markup-compatibility/2006" xmlns:p14="http://schemas.microsoft.com/office/powerpoint/2010/main">
+    <mc:Choice Requires="p14">
       <p:transition spd="slow" p14:dur="1200">
         <p:dissolve/>
       </p:transition>
     </mc:Choice>
-    <mc:Fallback>
+    <mc:Fallback xmlns="">
       <p:transition spd="slow">
         <p:dissolve/>
       </p:transition>
@@ -10798,13 +10798,13 @@
   <p:clrMapOvr>
     <a:masterClrMapping/>
   </p:clrMapOvr>
-  <mc:AlternateContent xmlns:mc="http://schemas.openxmlformats.org/markup-compatibility/2006">
-    <mc:Choice xmlns:p14="http://schemas.microsoft.com/office/powerpoint/2010/main" Requires="p14">
+  <mc:AlternateContent xmlns:mc="http://schemas.openxmlformats.org/markup-compatibility/2006" xmlns:p14="http://schemas.microsoft.com/office/powerpoint/2010/main">
+    <mc:Choice Requires="p14">
       <p:transition spd="slow" p14:dur="1600">
         <p:blinds dir="vert"/>
       </p:transition>
     </mc:Choice>
-    <mc:Fallback>
+    <mc:Fallback xmlns="">
       <p:transition spd="slow">
         <p:blinds dir="vert"/>
       </p:transition>
@@ -11499,15 +11499,31 @@
                 <a:latin typeface="Times New Roman" panose="02020603050405020304" pitchFamily="18" charset="0"/>
                 <a:ea typeface="Times New Roman" panose="02020603050405020304" pitchFamily="18" charset="0"/>
               </a:rPr>
-              <a:t>: U narednim </a:t>
-            </a:r>
-            <a:r>
-              <a:rPr lang="hr-HR" sz="1600" kern="0" spc="-5" dirty="0" err="1">
-                <a:effectLst/>
-                <a:latin typeface="Times New Roman" panose="02020603050405020304" pitchFamily="18" charset="0"/>
-                <a:ea typeface="Times New Roman" panose="02020603050405020304" pitchFamily="18" charset="0"/>
-              </a:rPr>
-              <a:t>zahtevima</a:t>
+              <a:t>: U narednim zahtevima, klijent uključuje </a:t>
+            </a:r>
+            <a:r>
+              <a:rPr lang="hr-HR" sz="1600" kern="0" spc="-5" dirty="0" smtClean="0">
+                <a:effectLst/>
+                <a:latin typeface="Times New Roman" panose="02020603050405020304" pitchFamily="18" charset="0"/>
+                <a:ea typeface="Times New Roman" panose="02020603050405020304" pitchFamily="18" charset="0"/>
+              </a:rPr>
+              <a:t>J</a:t>
+            </a:r>
+            <a:r>
+              <a:rPr lang="en-US" sz="1600" kern="0" spc="-5" dirty="0" smtClean="0">
+                <a:effectLst/>
+                <a:latin typeface="Times New Roman" panose="02020603050405020304" pitchFamily="18" charset="0"/>
+                <a:ea typeface="Times New Roman" panose="02020603050405020304" pitchFamily="18" charset="0"/>
+              </a:rPr>
+              <a:t>W</a:t>
+            </a:r>
+            <a:r>
+              <a:rPr lang="hr-HR" sz="1600" kern="0" spc="-5" dirty="0" smtClean="0">
+                <a:effectLst/>
+                <a:latin typeface="Times New Roman" panose="02020603050405020304" pitchFamily="18" charset="0"/>
+                <a:ea typeface="Times New Roman" panose="02020603050405020304" pitchFamily="18" charset="0"/>
+              </a:rPr>
+              <a:t>T </a:t>
             </a:r>
             <a:r>
               <a:rPr lang="hr-HR" sz="1600" kern="0" spc="-5" dirty="0">
@@ -11515,39 +11531,7 @@
                 <a:latin typeface="Times New Roman" panose="02020603050405020304" pitchFamily="18" charset="0"/>
                 <a:ea typeface="Times New Roman" panose="02020603050405020304" pitchFamily="18" charset="0"/>
               </a:rPr>
-              <a:t>, klijent uključuje JVT token u zaglavlja </a:t>
-            </a:r>
-            <a:r>
-              <a:rPr lang="hr-HR" sz="1600" kern="0" spc="-5" dirty="0" err="1">
-                <a:effectLst/>
-                <a:latin typeface="Times New Roman" panose="02020603050405020304" pitchFamily="18" charset="0"/>
-                <a:ea typeface="Times New Roman" panose="02020603050405020304" pitchFamily="18" charset="0"/>
-              </a:rPr>
-              <a:t>zahteva</a:t>
-            </a:r>
-            <a:r>
-              <a:rPr lang="hr-HR" sz="1600" kern="0" spc="-5" dirty="0">
-                <a:effectLst/>
-                <a:latin typeface="Times New Roman" panose="02020603050405020304" pitchFamily="18" charset="0"/>
-                <a:ea typeface="Times New Roman" panose="02020603050405020304" pitchFamily="18" charset="0"/>
-              </a:rPr>
-              <a:t>, obično u zaglavlju „</a:t>
-            </a:r>
-            <a:r>
-              <a:rPr lang="hr-HR" sz="1600" kern="0" spc="-5" dirty="0" err="1">
-                <a:effectLst/>
-                <a:latin typeface="Times New Roman" panose="02020603050405020304" pitchFamily="18" charset="0"/>
-                <a:ea typeface="Times New Roman" panose="02020603050405020304" pitchFamily="18" charset="0"/>
-              </a:rPr>
-              <a:t>Ovlašćenja</a:t>
-            </a:r>
-            <a:r>
-              <a:rPr lang="hr-HR" sz="1600" kern="0" spc="-5" dirty="0">
-                <a:effectLst/>
-                <a:latin typeface="Times New Roman" panose="02020603050405020304" pitchFamily="18" charset="0"/>
-                <a:ea typeface="Times New Roman" panose="02020603050405020304" pitchFamily="18" charset="0"/>
-              </a:rPr>
-              <a:t>“ sa prefiksom „Nosilac“. Server </a:t>
+              <a:t>token u zaglavlja zahteva, obično u zaglavlju „Ovlašćenja“ sa prefiksom „Nosilac“. Server </a:t>
             </a:r>
             <a:r>
               <a:rPr lang="hr-HR" sz="1600" kern="0" spc="-5" dirty="0" err="1">
@@ -11746,13 +11730,13 @@
   <p:clrMapOvr>
     <a:masterClrMapping/>
   </p:clrMapOvr>
-  <mc:AlternateContent xmlns:mc="http://schemas.openxmlformats.org/markup-compatibility/2006">
-    <mc:Choice xmlns:p14="http://schemas.microsoft.com/office/powerpoint/2010/main" Requires="p14">
+  <mc:AlternateContent xmlns:mc="http://schemas.openxmlformats.org/markup-compatibility/2006" xmlns:p14="http://schemas.microsoft.com/office/powerpoint/2010/main">
+    <mc:Choice Requires="p14">
       <p:transition spd="slow" p14:dur="1250">
         <p14:flip dir="r"/>
       </p:transition>
     </mc:Choice>
-    <mc:Fallback>
+    <mc:Fallback xmlns="">
       <p:transition spd="slow">
         <p:fade/>
       </p:transition>
@@ -12279,13 +12263,13 @@
   <p:clrMapOvr>
     <a:masterClrMapping/>
   </p:clrMapOvr>
-  <mc:AlternateContent xmlns:mc="http://schemas.openxmlformats.org/markup-compatibility/2006">
-    <mc:Choice xmlns:p14="http://schemas.microsoft.com/office/powerpoint/2010/main" Requires="p14">
+  <mc:AlternateContent xmlns:mc="http://schemas.openxmlformats.org/markup-compatibility/2006" xmlns:p14="http://schemas.microsoft.com/office/powerpoint/2010/main">
+    <mc:Choice Requires="p14">
       <p:transition spd="slow">
         <p14:flash/>
       </p:transition>
     </mc:Choice>
-    <mc:Fallback>
+    <mc:Fallback xmlns="">
       <p:transition spd="slow">
         <p:fade/>
       </p:transition>

</xml_diff>